<commit_message>
Update understand start, inside, end time period image
</commit_message>
<xml_diff>
--- a/demo/powerpoint/demo_maat_transfo_period.pptx
+++ b/demo/powerpoint/demo_maat_transfo_period.pptx
@@ -243,7 +243,7 @@
           <a:p>
             <a:fld id="{A0946C66-99AB-4BAB-B3CF-7EF1A62EDD51}" type="datetimeFigureOut">
               <a:rPr lang="fr-FR" smtClean="0"/>
-              <a:t>26/10/2022</a:t>
+              <a:t>27/10/2022</a:t>
             </a:fld>
             <a:endParaRPr lang="fr-FR"/>
           </a:p>
@@ -413,7 +413,7 @@
           <a:p>
             <a:fld id="{A0946C66-99AB-4BAB-B3CF-7EF1A62EDD51}" type="datetimeFigureOut">
               <a:rPr lang="fr-FR" smtClean="0"/>
-              <a:t>26/10/2022</a:t>
+              <a:t>27/10/2022</a:t>
             </a:fld>
             <a:endParaRPr lang="fr-FR"/>
           </a:p>
@@ -593,7 +593,7 @@
           <a:p>
             <a:fld id="{A0946C66-99AB-4BAB-B3CF-7EF1A62EDD51}" type="datetimeFigureOut">
               <a:rPr lang="fr-FR" smtClean="0"/>
-              <a:t>26/10/2022</a:t>
+              <a:t>27/10/2022</a:t>
             </a:fld>
             <a:endParaRPr lang="fr-FR"/>
           </a:p>
@@ -763,7 +763,7 @@
           <a:p>
             <a:fld id="{A0946C66-99AB-4BAB-B3CF-7EF1A62EDD51}" type="datetimeFigureOut">
               <a:rPr lang="fr-FR" smtClean="0"/>
-              <a:t>26/10/2022</a:t>
+              <a:t>27/10/2022</a:t>
             </a:fld>
             <a:endParaRPr lang="fr-FR"/>
           </a:p>
@@ -1009,7 +1009,7 @@
           <a:p>
             <a:fld id="{A0946C66-99AB-4BAB-B3CF-7EF1A62EDD51}" type="datetimeFigureOut">
               <a:rPr lang="fr-FR" smtClean="0"/>
-              <a:t>26/10/2022</a:t>
+              <a:t>27/10/2022</a:t>
             </a:fld>
             <a:endParaRPr lang="fr-FR"/>
           </a:p>
@@ -1241,7 +1241,7 @@
           <a:p>
             <a:fld id="{A0946C66-99AB-4BAB-B3CF-7EF1A62EDD51}" type="datetimeFigureOut">
               <a:rPr lang="fr-FR" smtClean="0"/>
-              <a:t>26/10/2022</a:t>
+              <a:t>27/10/2022</a:t>
             </a:fld>
             <a:endParaRPr lang="fr-FR"/>
           </a:p>
@@ -1608,7 +1608,7 @@
           <a:p>
             <a:fld id="{A0946C66-99AB-4BAB-B3CF-7EF1A62EDD51}" type="datetimeFigureOut">
               <a:rPr lang="fr-FR" smtClean="0"/>
-              <a:t>26/10/2022</a:t>
+              <a:t>27/10/2022</a:t>
             </a:fld>
             <a:endParaRPr lang="fr-FR"/>
           </a:p>
@@ -1726,7 +1726,7 @@
           <a:p>
             <a:fld id="{A0946C66-99AB-4BAB-B3CF-7EF1A62EDD51}" type="datetimeFigureOut">
               <a:rPr lang="fr-FR" smtClean="0"/>
-              <a:t>26/10/2022</a:t>
+              <a:t>27/10/2022</a:t>
             </a:fld>
             <a:endParaRPr lang="fr-FR"/>
           </a:p>
@@ -1821,7 +1821,7 @@
           <a:p>
             <a:fld id="{A0946C66-99AB-4BAB-B3CF-7EF1A62EDD51}" type="datetimeFigureOut">
               <a:rPr lang="fr-FR" smtClean="0"/>
-              <a:t>26/10/2022</a:t>
+              <a:t>27/10/2022</a:t>
             </a:fld>
             <a:endParaRPr lang="fr-FR"/>
           </a:p>
@@ -2098,7 +2098,7 @@
           <a:p>
             <a:fld id="{A0946C66-99AB-4BAB-B3CF-7EF1A62EDD51}" type="datetimeFigureOut">
               <a:rPr lang="fr-FR" smtClean="0"/>
-              <a:t>26/10/2022</a:t>
+              <a:t>27/10/2022</a:t>
             </a:fld>
             <a:endParaRPr lang="fr-FR"/>
           </a:p>
@@ -2351,7 +2351,7 @@
           <a:p>
             <a:fld id="{A0946C66-99AB-4BAB-B3CF-7EF1A62EDD51}" type="datetimeFigureOut">
               <a:rPr lang="fr-FR" smtClean="0"/>
-              <a:t>26/10/2022</a:t>
+              <a:t>27/10/2022</a:t>
             </a:fld>
             <a:endParaRPr lang="fr-FR"/>
           </a:p>
@@ -2564,7 +2564,7 @@
           <a:p>
             <a:fld id="{A0946C66-99AB-4BAB-B3CF-7EF1A62EDD51}" type="datetimeFigureOut">
               <a:rPr lang="fr-FR" smtClean="0"/>
-              <a:t>26/10/2022</a:t>
+              <a:t>27/10/2022</a:t>
             </a:fld>
             <a:endParaRPr lang="fr-FR"/>
           </a:p>
@@ -3666,7 +3666,23 @@
                     <a:schemeClr val="tx1"/>
                   </a:solidFill>
                 </a:rPr>
-                <a:t>at timeout </a:t>
+                <a:t>at </a:t>
+              </a:r>
+              <a:r>
+                <a:rPr lang="fr-FR" sz="1600" b="1" dirty="0" smtClean="0">
+                  <a:solidFill>
+                    <a:schemeClr val="tx1"/>
+                  </a:solidFill>
+                </a:rPr>
+                <a:t>end </a:t>
+              </a:r>
+              <a:r>
+                <a:rPr lang="fr-FR" sz="1600" b="1" dirty="0" smtClean="0">
+                  <a:solidFill>
+                    <a:schemeClr val="tx1"/>
+                  </a:solidFill>
+                </a:rPr>
+                <a:t>time </a:t>
               </a:r>
               <a:r>
                 <a:rPr lang="fr-FR" sz="1600" b="1" dirty="0" err="1" smtClean="0">
@@ -3674,10 +3690,26 @@
                     <a:schemeClr val="tx1"/>
                   </a:solidFill>
                 </a:rPr>
+                <a:t>period</a:t>
+              </a:r>
+              <a:r>
+                <a:rPr lang="fr-FR" sz="1600" b="1" dirty="0" smtClean="0">
+                  <a:solidFill>
+                    <a:schemeClr val="tx1"/>
+                  </a:solidFill>
+                </a:rPr>
+                <a:t> </a:t>
+              </a:r>
+              <a:r>
+                <a:rPr lang="fr-FR" sz="1600" b="1" dirty="0" err="1" smtClean="0">
+                  <a:solidFill>
+                    <a:schemeClr val="tx1"/>
+                  </a:solidFill>
+                </a:rPr>
                 <a:t>after</a:t>
               </a:r>
               <a:r>
-                <a:rPr lang="fr-FR" sz="1600" dirty="0">
+                <a:rPr lang="fr-FR" sz="1600" dirty="0" smtClean="0">
                   <a:solidFill>
                     <a:schemeClr val="tx1"/>
                   </a:solidFill>
@@ -3864,15 +3896,15 @@
         <p:nvCxnSpPr>
           <p:cNvPr id="45" name="Connecteur droit avec flèche 44"/>
           <p:cNvCxnSpPr>
-            <a:stCxn id="47" idx="3"/>
+            <a:stCxn id="5" idx="3"/>
             <a:endCxn id="29" idx="1"/>
           </p:cNvCxnSpPr>
           <p:nvPr/>
         </p:nvCxnSpPr>
         <p:spPr>
-          <a:xfrm flipV="1">
-            <a:off x="2480185" y="3440420"/>
-            <a:ext cx="1778725" cy="5787"/>
+          <a:xfrm>
+            <a:off x="2363834" y="3440420"/>
+            <a:ext cx="1895076" cy="0"/>
           </a:xfrm>
           <a:prstGeom prst="straightConnector1">
             <a:avLst/>
@@ -3949,14 +3981,14 @@
           <p:cNvPr id="46" name="Connecteur droit avec flèche 45"/>
           <p:cNvCxnSpPr>
             <a:stCxn id="34" idx="2"/>
-            <a:endCxn id="47" idx="0"/>
+            <a:endCxn id="5" idx="0"/>
           </p:cNvCxnSpPr>
           <p:nvPr/>
         </p:nvCxnSpPr>
         <p:spPr>
-          <a:xfrm flipH="1">
-            <a:off x="2080751" y="1685767"/>
-            <a:ext cx="20186" cy="1627704"/>
+          <a:xfrm>
+            <a:off x="2100937" y="1685767"/>
+            <a:ext cx="23929" cy="1497853"/>
           </a:xfrm>
           <a:prstGeom prst="straightConnector1">
             <a:avLst/>
@@ -3991,71 +4023,19 @@
           </a:fontRef>
         </p:style>
       </p:cxnSp>
-      <p:sp>
-        <p:nvSpPr>
-          <p:cNvPr id="47" name="Organigramme : Décision 46"/>
-          <p:cNvSpPr/>
-          <p:nvPr/>
-        </p:nvSpPr>
-        <p:spPr>
-          <a:xfrm>
-            <a:off x="1681316" y="3313471"/>
-            <a:ext cx="798869" cy="265471"/>
-          </a:xfrm>
-          <a:prstGeom prst="flowChartDecision">
-            <a:avLst/>
-          </a:prstGeom>
-          <a:ln w="28575">
-            <a:solidFill>
-              <a:schemeClr val="tx1"/>
-            </a:solidFill>
-            <a:headEnd type="none" w="med" len="med"/>
-            <a:tailEnd type="arrow" w="med" len="med"/>
-          </a:ln>
-          <a:effectLst>
-            <a:outerShdw blurRad="50800" dist="38100" dir="5400000" algn="t" rotWithShape="0">
-              <a:prstClr val="black">
-                <a:alpha val="40000"/>
-              </a:prstClr>
-            </a:outerShdw>
-          </a:effectLst>
-        </p:spPr>
-        <p:style>
-          <a:lnRef idx="2">
-            <a:schemeClr val="accent6"/>
-          </a:lnRef>
-          <a:fillRef idx="1">
-            <a:schemeClr val="lt1"/>
-          </a:fillRef>
-          <a:effectRef idx="0">
-            <a:schemeClr val="accent6"/>
-          </a:effectRef>
-          <a:fontRef idx="minor">
-            <a:schemeClr val="dk1"/>
-          </a:fontRef>
-        </p:style>
-        <p:txBody>
-          <a:bodyPr rtlCol="0" anchor="ctr"/>
-          <a:lstStyle/>
-          <a:p>
-            <a:pPr algn="ctr"/>
-            <a:endParaRPr lang="fr-FR"/>
-          </a:p>
-        </p:txBody>
-      </p:sp>
       <p:cxnSp>
         <p:nvCxnSpPr>
           <p:cNvPr id="51" name="Connecteur en angle 50"/>
           <p:cNvCxnSpPr>
-            <a:stCxn id="47" idx="2"/>
+            <a:stCxn id="5" idx="2"/>
             <a:endCxn id="42" idx="1"/>
           </p:cNvCxnSpPr>
           <p:nvPr/>
         </p:nvCxnSpPr>
         <p:spPr>
           <a:xfrm rot="16200000" flipH="1">
-            <a:off x="2561860" y="3097832"/>
-            <a:ext cx="1820477" cy="2782695"/>
+            <a:off x="2643057" y="3179029"/>
+            <a:ext cx="1702199" cy="2738580"/>
           </a:xfrm>
           <a:prstGeom prst="bentConnector2">
             <a:avLst/>
@@ -4098,7 +4078,7 @@
         </p:nvSpPr>
         <p:spPr>
           <a:xfrm>
-            <a:off x="2363834" y="2806312"/>
+            <a:off x="2784827" y="3025502"/>
             <a:ext cx="675185" cy="338554"/>
           </a:xfrm>
           <a:prstGeom prst="rect">
@@ -4128,7 +4108,7 @@
         </p:nvSpPr>
         <p:spPr>
           <a:xfrm>
-            <a:off x="2414328" y="4899549"/>
+            <a:off x="3024274" y="5043731"/>
             <a:ext cx="574196" cy="338554"/>
           </a:xfrm>
           <a:prstGeom prst="rect">
@@ -4152,19 +4132,64 @@
       </p:sp>
       <p:sp>
         <p:nvSpPr>
-          <p:cNvPr id="57" name="Triangle isocèle 56"/>
-          <p:cNvSpPr/>
+          <p:cNvPr id="64" name="ZoneTexte 63"/>
+          <p:cNvSpPr txBox="1"/>
           <p:nvPr/>
         </p:nvSpPr>
         <p:spPr>
-          <a:xfrm rot="10800000">
-            <a:off x="7229737" y="6466935"/>
-            <a:ext cx="703715" cy="222623"/>
+          <a:xfrm>
+            <a:off x="9373026" y="2283163"/>
+            <a:ext cx="1138453" cy="338554"/>
           </a:xfrm>
-          <a:prstGeom prst="triangle">
+          <a:prstGeom prst="rect">
             <a:avLst/>
           </a:prstGeom>
           <a:noFill/>
+        </p:spPr>
+        <p:txBody>
+          <a:bodyPr wrap="none" rtlCol="0">
+            <a:spAutoFit/>
+          </a:bodyPr>
+          <a:lstStyle/>
+          <a:p>
+            <a:r>
+              <a:rPr lang="fr-FR" sz="1600" i="1" dirty="0" smtClean="0">
+                <a:solidFill>
+                  <a:srgbClr val="92D050"/>
+                </a:solidFill>
+              </a:rPr>
+              <a:t>time </a:t>
+            </a:r>
+            <a:r>
+              <a:rPr lang="fr-FR" sz="1600" i="1" dirty="0" err="1" smtClean="0">
+                <a:solidFill>
+                  <a:srgbClr val="92D050"/>
+                </a:solidFill>
+              </a:rPr>
+              <a:t>period</a:t>
+            </a:r>
+            <a:endParaRPr lang="fr-FR" sz="1600" i="1" dirty="0">
+              <a:solidFill>
+                <a:srgbClr val="92D050"/>
+              </a:solidFill>
+            </a:endParaRPr>
+          </a:p>
+        </p:txBody>
+      </p:sp>
+      <p:sp>
+        <p:nvSpPr>
+          <p:cNvPr id="5" name="Rectangle 4"/>
+          <p:cNvSpPr/>
+          <p:nvPr/>
+        </p:nvSpPr>
+        <p:spPr>
+          <a:xfrm>
+            <a:off x="1885898" y="3183620"/>
+            <a:ext cx="477936" cy="513600"/>
+          </a:xfrm>
+          <a:prstGeom prst="rect">
+            <a:avLst/>
+          </a:prstGeom>
           <a:ln w="28575">
             <a:solidFill>
               <a:schemeClr val="tx1"/>
@@ -4199,20 +4224,32 @@
           <a:lstStyle/>
           <a:p>
             <a:pPr algn="ctr"/>
-            <a:endParaRPr lang="fr-FR"/>
-          </a:p>
-        </p:txBody>
-      </p:sp>
-      <p:sp>
-        <p:nvSpPr>
-          <p:cNvPr id="63" name="ZoneTexte 62"/>
+            <a:r>
+              <a:rPr lang="fr-FR" dirty="0" smtClean="0">
+                <a:solidFill>
+                  <a:schemeClr val="dk1"/>
+                </a:solidFill>
+              </a:rPr>
+              <a:t>+</a:t>
+            </a:r>
+            <a:endParaRPr lang="fr-FR" dirty="0">
+              <a:solidFill>
+                <a:schemeClr val="dk1"/>
+              </a:solidFill>
+            </a:endParaRPr>
+          </a:p>
+        </p:txBody>
+      </p:sp>
+      <p:sp>
+        <p:nvSpPr>
+          <p:cNvPr id="12" name="ZoneTexte 11"/>
           <p:cNvSpPr txBox="1"/>
           <p:nvPr/>
         </p:nvSpPr>
         <p:spPr>
           <a:xfrm>
-            <a:off x="7933452" y="6506263"/>
-            <a:ext cx="1483098" cy="338554"/>
+            <a:off x="1048250" y="3325370"/>
+            <a:ext cx="792205" cy="369332"/>
           </a:xfrm>
           <a:prstGeom prst="rect">
             <a:avLst/>
@@ -4226,71 +4263,10 @@
           <a:lstStyle/>
           <a:p>
             <a:r>
-              <a:rPr lang="fr-FR" sz="1600" i="1" dirty="0" smtClean="0"/>
-              <a:t>timeout </a:t>
-            </a:r>
-            <a:r>
-              <a:rPr lang="fr-FR" sz="1600" i="1" dirty="0" err="1" smtClean="0"/>
-              <a:t>clock</a:t>
-            </a:r>
-            <a:r>
-              <a:rPr lang="fr-FR" sz="1600" i="1" dirty="0" smtClean="0"/>
-              <a:t> x </a:t>
-            </a:r>
-          </a:p>
-        </p:txBody>
-      </p:sp>
-      <p:sp>
-        <p:nvSpPr>
-          <p:cNvPr id="64" name="ZoneTexte 63"/>
-          <p:cNvSpPr txBox="1"/>
-          <p:nvPr/>
-        </p:nvSpPr>
-        <p:spPr>
-          <a:xfrm>
-            <a:off x="9373026" y="2283163"/>
-            <a:ext cx="1290738" cy="338554"/>
-          </a:xfrm>
-          <a:prstGeom prst="rect">
-            <a:avLst/>
-          </a:prstGeom>
-          <a:noFill/>
-        </p:spPr>
-        <p:txBody>
-          <a:bodyPr wrap="none" rtlCol="0">
-            <a:spAutoFit/>
-          </a:bodyPr>
-          <a:lstStyle/>
-          <a:p>
-            <a:r>
-              <a:rPr lang="fr-FR" sz="1600" i="1" dirty="0" smtClean="0">
-                <a:solidFill>
-                  <a:srgbClr val="92D050"/>
-                </a:solidFill>
-              </a:rPr>
-              <a:t>time </a:t>
-            </a:r>
-            <a:r>
-              <a:rPr lang="fr-FR" sz="1600" i="1" dirty="0" err="1" smtClean="0">
-                <a:solidFill>
-                  <a:srgbClr val="92D050"/>
-                </a:solidFill>
-              </a:rPr>
-              <a:t>period</a:t>
-            </a:r>
-            <a:r>
-              <a:rPr lang="fr-FR" sz="1600" i="1" dirty="0" smtClean="0">
-                <a:solidFill>
-                  <a:srgbClr val="92D050"/>
-                </a:solidFill>
-              </a:rPr>
-              <a:t> d</a:t>
-            </a:r>
-            <a:endParaRPr lang="fr-FR" sz="1600" i="1" dirty="0">
-              <a:solidFill>
-                <a:srgbClr val="92D050"/>
-              </a:solidFill>
-            </a:endParaRPr>
+              <a:rPr lang="fr-FR" i="1" dirty="0" err="1" smtClean="0"/>
+              <a:t>choice</a:t>
+            </a:r>
+            <a:endParaRPr lang="fr-FR" i="1" dirty="0"/>
           </a:p>
         </p:txBody>
       </p:sp>

</xml_diff>

<commit_message>
Update syntax end time period
</commit_message>
<xml_diff>
--- a/demo/powerpoint/demo_maat_transfo_period.pptx
+++ b/demo/powerpoint/demo_maat_transfo_period.pptx
@@ -3685,7 +3685,7 @@
                 <a:t>time </a:t>
               </a:r>
               <a:r>
-                <a:rPr lang="fr-FR" sz="1600" b="1" dirty="0" err="1" smtClean="0">
+                <a:rPr lang="fr-FR" sz="1600" b="1" smtClean="0">
                   <a:solidFill>
                     <a:schemeClr val="tx1"/>
                   </a:solidFill>
@@ -3693,23 +3693,7 @@
                 <a:t>period</a:t>
               </a:r>
               <a:r>
-                <a:rPr lang="fr-FR" sz="1600" b="1" dirty="0" smtClean="0">
-                  <a:solidFill>
-                    <a:schemeClr val="tx1"/>
-                  </a:solidFill>
-                </a:rPr>
-                <a:t> </a:t>
-              </a:r>
-              <a:r>
-                <a:rPr lang="fr-FR" sz="1600" b="1" dirty="0" err="1" smtClean="0">
-                  <a:solidFill>
-                    <a:schemeClr val="tx1"/>
-                  </a:solidFill>
-                </a:rPr>
-                <a:t>after</a:t>
-              </a:r>
-              <a:r>
-                <a:rPr lang="fr-FR" sz="1600" dirty="0" smtClean="0">
+                <a:rPr lang="fr-FR" sz="1600" smtClean="0">
                   <a:solidFill>
                     <a:schemeClr val="tx1"/>
                   </a:solidFill>

</xml_diff>